<commit_message>
Edit pres draft a bit
</commit_message>
<xml_diff>
--- a/linsley_postdoc/presentations/weekly_meetings/10_5_23.pptx
+++ b/linsley_postdoc/presentations/weekly_meetings/10_5_23.pptx
@@ -216,7 +216,7 @@
           <a:p>
             <a:fld id="{E933A773-0DCE-3544-BB67-D5FA58DF903C}" type="datetimeFigureOut">
               <a:rPr lang="en-US" smtClean="0"/>
-              <a:t>10/2/23</a:t>
+              <a:t>10/3/23</a:t>
             </a:fld>
             <a:endParaRPr lang="en-US"/>
           </a:p>
@@ -848,7 +848,7 @@
           <a:p>
             <a:fld id="{80FC6068-BAFB-FC44-B9D8-F4B3BB105DE6}" type="datetimeFigureOut">
               <a:rPr lang="en-US" smtClean="0"/>
-              <a:t>10/2/23</a:t>
+              <a:t>10/3/23</a:t>
             </a:fld>
             <a:endParaRPr lang="en-US"/>
           </a:p>
@@ -1046,7 +1046,7 @@
           <a:p>
             <a:fld id="{80FC6068-BAFB-FC44-B9D8-F4B3BB105DE6}" type="datetimeFigureOut">
               <a:rPr lang="en-US" smtClean="0"/>
-              <a:t>10/2/23</a:t>
+              <a:t>10/3/23</a:t>
             </a:fld>
             <a:endParaRPr lang="en-US"/>
           </a:p>
@@ -1254,7 +1254,7 @@
           <a:p>
             <a:fld id="{80FC6068-BAFB-FC44-B9D8-F4B3BB105DE6}" type="datetimeFigureOut">
               <a:rPr lang="en-US" smtClean="0"/>
-              <a:t>10/2/23</a:t>
+              <a:t>10/3/23</a:t>
             </a:fld>
             <a:endParaRPr lang="en-US"/>
           </a:p>
@@ -1458,7 +1458,7 @@
           <a:p>
             <a:fld id="{80FC6068-BAFB-FC44-B9D8-F4B3BB105DE6}" type="datetimeFigureOut">
               <a:rPr lang="en-US" smtClean="0"/>
-              <a:t>10/2/23</a:t>
+              <a:t>10/3/23</a:t>
             </a:fld>
             <a:endParaRPr lang="en-US"/>
           </a:p>
@@ -1749,7 +1749,7 @@
           <a:p>
             <a:fld id="{80FC6068-BAFB-FC44-B9D8-F4B3BB105DE6}" type="datetimeFigureOut">
               <a:rPr lang="en-US" smtClean="0"/>
-              <a:t>10/2/23</a:t>
+              <a:t>10/3/23</a:t>
             </a:fld>
             <a:endParaRPr lang="en-US"/>
           </a:p>
@@ -2014,7 +2014,7 @@
           <a:p>
             <a:fld id="{80FC6068-BAFB-FC44-B9D8-F4B3BB105DE6}" type="datetimeFigureOut">
               <a:rPr lang="en-US" smtClean="0"/>
-              <a:t>10/2/23</a:t>
+              <a:t>10/3/23</a:t>
             </a:fld>
             <a:endParaRPr lang="en-US"/>
           </a:p>
@@ -2426,7 +2426,7 @@
           <a:p>
             <a:fld id="{80FC6068-BAFB-FC44-B9D8-F4B3BB105DE6}" type="datetimeFigureOut">
               <a:rPr lang="en-US" smtClean="0"/>
-              <a:t>10/2/23</a:t>
+              <a:t>10/3/23</a:t>
             </a:fld>
             <a:endParaRPr lang="en-US"/>
           </a:p>
@@ -2567,7 +2567,7 @@
           <a:p>
             <a:fld id="{80FC6068-BAFB-FC44-B9D8-F4B3BB105DE6}" type="datetimeFigureOut">
               <a:rPr lang="en-US" smtClean="0"/>
-              <a:t>10/2/23</a:t>
+              <a:t>10/3/23</a:t>
             </a:fld>
             <a:endParaRPr lang="en-US"/>
           </a:p>
@@ -2680,7 +2680,7 @@
           <a:p>
             <a:fld id="{80FC6068-BAFB-FC44-B9D8-F4B3BB105DE6}" type="datetimeFigureOut">
               <a:rPr lang="en-US" smtClean="0"/>
-              <a:t>10/2/23</a:t>
+              <a:t>10/3/23</a:t>
             </a:fld>
             <a:endParaRPr lang="en-US"/>
           </a:p>
@@ -2991,7 +2991,7 @@
           <a:p>
             <a:fld id="{80FC6068-BAFB-FC44-B9D8-F4B3BB105DE6}" type="datetimeFigureOut">
               <a:rPr lang="en-US" smtClean="0"/>
-              <a:t>10/2/23</a:t>
+              <a:t>10/3/23</a:t>
             </a:fld>
             <a:endParaRPr lang="en-US"/>
           </a:p>
@@ -3279,7 +3279,7 @@
           <a:p>
             <a:fld id="{80FC6068-BAFB-FC44-B9D8-F4B3BB105DE6}" type="datetimeFigureOut">
               <a:rPr lang="en-US" smtClean="0"/>
-              <a:t>10/2/23</a:t>
+              <a:t>10/3/23</a:t>
             </a:fld>
             <a:endParaRPr lang="en-US"/>
           </a:p>
@@ -3520,7 +3520,7 @@
           <a:p>
             <a:fld id="{80FC6068-BAFB-FC44-B9D8-F4B3BB105DE6}" type="datetimeFigureOut">
               <a:rPr lang="en-US" smtClean="0"/>
-              <a:t>10/2/23</a:t>
+              <a:t>10/3/23</a:t>
             </a:fld>
             <a:endParaRPr lang="en-US"/>
           </a:p>
@@ -4533,6 +4533,14 @@
           <a:bodyPr/>
           <a:lstStyle/>
           <a:p>
+            <a:r>
+              <a:rPr lang="en-US" dirty="0"/>
+              <a:t>Insights from </a:t>
+            </a:r>
+            <a:r>
+              <a:rPr lang="en-US"/>
+              <a:t>discussion section</a:t>
+            </a:r>
             <a:endParaRPr lang="en-US" dirty="0"/>
           </a:p>
         </p:txBody>

</xml_diff>